<commit_message>
Added patterns to presentation
</commit_message>
<xml_diff>
--- a/Documentation/OOP_Presentation.pptx
+++ b/Documentation/OOP_Presentation.pptx
@@ -8,10 +8,11 @@
     <p:sldId id="256" r:id="rId2"/>
     <p:sldId id="257" r:id="rId3"/>
     <p:sldId id="259" r:id="rId4"/>
-    <p:sldId id="258" r:id="rId5"/>
-    <p:sldId id="260" r:id="rId6"/>
-    <p:sldId id="262" r:id="rId7"/>
-    <p:sldId id="261" r:id="rId8"/>
+    <p:sldId id="263" r:id="rId5"/>
+    <p:sldId id="258" r:id="rId6"/>
+    <p:sldId id="260" r:id="rId7"/>
+    <p:sldId id="262" r:id="rId8"/>
+    <p:sldId id="261" r:id="rId9"/>
   </p:sldIdLst>
   <p:sldSz cx="12192000" cy="6858000"/>
   <p:notesSz cx="6858000" cy="9144000"/>
@@ -110,6 +111,11 @@
       </a:defRPr>
     </a:lvl9pPr>
   </p:defaultTextStyle>
+  <p:extLst>
+    <p:ext uri="{EFAFB233-063F-42B5-8137-9DF3F51BA10A}">
+      <p15:sldGuideLst xmlns:p15="http://schemas.microsoft.com/office/powerpoint/2012/main"/>
+    </p:ext>
+  </p:extLst>
 </p:presentation>
 </file>
 
@@ -6120,7 +6126,7 @@
           <p:cNvPr id="2" name="Title 1">
             <a:extLst>
               <a:ext uri="{FF2B5EF4-FFF2-40B4-BE49-F238E27FC236}">
-                <a16:creationId xmlns:a16="http://schemas.microsoft.com/office/drawing/2014/main" id="{57649FC1-CD97-4B30-8B31-DE24AAC2E914}"/>
+                <a16:creationId xmlns:a16="http://schemas.microsoft.com/office/drawing/2014/main" xmlns="" id="{57649FC1-CD97-4B30-8B31-DE24AAC2E914}"/>
               </a:ext>
             </a:extLst>
           </p:cNvPr>
@@ -6148,7 +6154,7 @@
           <p:cNvPr id="3" name="Subtitle 2">
             <a:extLst>
               <a:ext uri="{FF2B5EF4-FFF2-40B4-BE49-F238E27FC236}">
-                <a16:creationId xmlns:a16="http://schemas.microsoft.com/office/drawing/2014/main" id="{EFB65903-B1DA-406A-BE6A-17CE6ABF031A}"/>
+                <a16:creationId xmlns:a16="http://schemas.microsoft.com/office/drawing/2014/main" xmlns="" id="{EFB65903-B1DA-406A-BE6A-17CE6ABF031A}"/>
               </a:ext>
             </a:extLst>
           </p:cNvPr>
@@ -6176,7 +6182,7 @@
           <p:cNvPr id="5" name="Picture 4">
             <a:extLst>
               <a:ext uri="{FF2B5EF4-FFF2-40B4-BE49-F238E27FC236}">
-                <a16:creationId xmlns:a16="http://schemas.microsoft.com/office/drawing/2014/main" id="{0CED5898-506D-41F1-B38C-5F7D197AAF2D}"/>
+                <a16:creationId xmlns:a16="http://schemas.microsoft.com/office/drawing/2014/main" xmlns="" id="{0CED5898-506D-41F1-B38C-5F7D197AAF2D}"/>
               </a:ext>
             </a:extLst>
           </p:cNvPr>
@@ -6235,7 +6241,7 @@
           <p:cNvPr id="2" name="Title 1">
             <a:extLst>
               <a:ext uri="{FF2B5EF4-FFF2-40B4-BE49-F238E27FC236}">
-                <a16:creationId xmlns:a16="http://schemas.microsoft.com/office/drawing/2014/main" id="{CFE5B15D-E980-4C0B-8D67-3C3D19EA2403}"/>
+                <a16:creationId xmlns:a16="http://schemas.microsoft.com/office/drawing/2014/main" xmlns="" id="{CFE5B15D-E980-4C0B-8D67-3C3D19EA2403}"/>
               </a:ext>
             </a:extLst>
           </p:cNvPr>
@@ -6263,7 +6269,7 @@
           <p:cNvPr id="3" name="Content Placeholder 2">
             <a:extLst>
               <a:ext uri="{FF2B5EF4-FFF2-40B4-BE49-F238E27FC236}">
-                <a16:creationId xmlns:a16="http://schemas.microsoft.com/office/drawing/2014/main" id="{FEC195D9-AF9A-4800-9A8C-3794FC474987}"/>
+                <a16:creationId xmlns:a16="http://schemas.microsoft.com/office/drawing/2014/main" xmlns="" id="{FEC195D9-AF9A-4800-9A8C-3794FC474987}"/>
               </a:ext>
             </a:extLst>
           </p:cNvPr>
@@ -6329,7 +6335,7 @@
           <p:cNvPr id="2" name="Title 1">
             <a:extLst>
               <a:ext uri="{FF2B5EF4-FFF2-40B4-BE49-F238E27FC236}">
-                <a16:creationId xmlns:a16="http://schemas.microsoft.com/office/drawing/2014/main" id="{896CF665-2FD4-4EE9-B4B6-9A98CA322810}"/>
+                <a16:creationId xmlns:a16="http://schemas.microsoft.com/office/drawing/2014/main" xmlns="" id="{896CF665-2FD4-4EE9-B4B6-9A98CA322810}"/>
               </a:ext>
             </a:extLst>
           </p:cNvPr>
@@ -6357,7 +6363,7 @@
           <p:cNvPr id="3" name="Content Placeholder 2">
             <a:extLst>
               <a:ext uri="{FF2B5EF4-FFF2-40B4-BE49-F238E27FC236}">
-                <a16:creationId xmlns:a16="http://schemas.microsoft.com/office/drawing/2014/main" id="{0BE4DCBA-F7DF-4E4C-9F96-9DEE24B5B28E}"/>
+                <a16:creationId xmlns:a16="http://schemas.microsoft.com/office/drawing/2014/main" xmlns="" id="{0BE4DCBA-F7DF-4E4C-9F96-9DEE24B5B28E}"/>
               </a:ext>
             </a:extLst>
           </p:cNvPr>
@@ -6456,61 +6462,60 @@
       </p:grpSpPr>
       <p:sp>
         <p:nvSpPr>
-          <p:cNvPr id="2" name="Title 1">
+          <p:cNvPr id="2" name="Title 1"/>
+          <p:cNvSpPr>
+            <a:spLocks noGrp="1"/>
+          </p:cNvSpPr>
+          <p:nvPr>
+            <p:ph type="title"/>
+          </p:nvPr>
+        </p:nvSpPr>
+        <p:spPr/>
+        <p:txBody>
+          <a:bodyPr/>
+          <a:lstStyle/>
+          <a:p>
+            <a:r>
+              <a:rPr lang="en-US" dirty="0" smtClean="0"/>
+              <a:t>Class Diagram</a:t>
+            </a:r>
+            <a:endParaRPr lang="en-US" dirty="0"/>
+          </a:p>
+        </p:txBody>
+      </p:sp>
+      <p:pic>
+        <p:nvPicPr>
+          <p:cNvPr id="4" name="Content Placeholder 3"/>
+          <p:cNvPicPr>
+            <a:picLocks noGrp="1" noChangeAspect="1"/>
+          </p:cNvPicPr>
+          <p:nvPr>
+            <p:ph idx="1"/>
+          </p:nvPr>
+        </p:nvPicPr>
+        <p:blipFill>
+          <a:blip r:embed="rId2">
             <a:extLst>
-              <a:ext uri="{FF2B5EF4-FFF2-40B4-BE49-F238E27FC236}">
-                <a16:creationId xmlns:a16="http://schemas.microsoft.com/office/drawing/2014/main" id="{9EE0733F-FCF9-4DFF-A7D3-C7EA49D11C14}"/>
+              <a:ext uri="{28A0092B-C50C-407E-A947-70E740481C1C}">
+                <a14:useLocalDpi xmlns:a14="http://schemas.microsoft.com/office/drawing/2010/main" val="0"/>
               </a:ext>
             </a:extLst>
-          </p:cNvPr>
-          <p:cNvSpPr>
-            <a:spLocks noGrp="1"/>
-          </p:cNvSpPr>
-          <p:nvPr>
-            <p:ph type="title"/>
-          </p:nvPr>
-        </p:nvSpPr>
-        <p:spPr/>
-        <p:txBody>
-          <a:bodyPr/>
-          <a:lstStyle/>
-          <a:p>
-            <a:r>
-              <a:rPr lang="en-US" dirty="0"/>
-              <a:t>Patterns we used</a:t>
-            </a:r>
-          </a:p>
-        </p:txBody>
-      </p:sp>
-      <p:sp>
-        <p:nvSpPr>
-          <p:cNvPr id="3" name="Content Placeholder 2">
-            <a:extLst>
-              <a:ext uri="{FF2B5EF4-FFF2-40B4-BE49-F238E27FC236}">
-                <a16:creationId xmlns:a16="http://schemas.microsoft.com/office/drawing/2014/main" id="{1DB76735-46BD-4FEF-82B0-2732FC364FCD}"/>
-              </a:ext>
-            </a:extLst>
-          </p:cNvPr>
-          <p:cNvSpPr>
-            <a:spLocks noGrp="1"/>
-          </p:cNvSpPr>
-          <p:nvPr>
-            <p:ph idx="1"/>
-          </p:nvPr>
-        </p:nvSpPr>
-        <p:spPr/>
-        <p:txBody>
-          <a:bodyPr/>
-          <a:lstStyle/>
-          <a:p>
-            <a:endParaRPr lang="en-US" dirty="0"/>
-          </a:p>
-        </p:txBody>
-      </p:sp>
+          </a:blip>
+          <a:stretch>
+            <a:fillRect/>
+          </a:stretch>
+        </p:blipFill>
+        <p:spPr>
+          <a:xfrm>
+            <a:off x="1905000" y="1339127"/>
+            <a:ext cx="7822043" cy="5298227"/>
+          </a:xfrm>
+        </p:spPr>
+      </p:pic>
     </p:spTree>
     <p:extLst>
       <p:ext uri="{BB962C8B-B14F-4D97-AF65-F5344CB8AC3E}">
-        <p14:creationId xmlns:p14="http://schemas.microsoft.com/office/powerpoint/2010/main" val="3333007403"/>
+        <p14:creationId xmlns:p14="http://schemas.microsoft.com/office/powerpoint/2010/main" val="3349042595"/>
       </p:ext>
     </p:extLst>
   </p:cSld>
@@ -6542,7 +6547,7 @@
           <p:cNvPr id="2" name="Title 1">
             <a:extLst>
               <a:ext uri="{FF2B5EF4-FFF2-40B4-BE49-F238E27FC236}">
-                <a16:creationId xmlns:a16="http://schemas.microsoft.com/office/drawing/2014/main" id="{94FD12B6-52C1-4DF8-A738-C8837C389265}"/>
+                <a16:creationId xmlns:a16="http://schemas.microsoft.com/office/drawing/2014/main" xmlns="" id="{9EE0733F-FCF9-4DFF-A7D3-C7EA49D11C14}"/>
               </a:ext>
             </a:extLst>
           </p:cNvPr>
@@ -6560,69 +6565,104 @@
           <a:p>
             <a:r>
               <a:rPr lang="en-US" dirty="0"/>
-              <a:t>What we learned?</a:t>
-            </a:r>
-          </a:p>
-        </p:txBody>
-      </p:sp>
-      <p:sp>
-        <p:nvSpPr>
-          <p:cNvPr id="3" name="Content Placeholder 2">
+              <a:t>Patterns we used</a:t>
+            </a:r>
+          </a:p>
+        </p:txBody>
+      </p:sp>
+      <p:pic>
+        <p:nvPicPr>
+          <p:cNvPr id="4" name="Content Placeholder 3"/>
+          <p:cNvPicPr>
+            <a:picLocks noGrp="1" noChangeAspect="1"/>
+          </p:cNvPicPr>
+          <p:nvPr>
+            <p:ph idx="1"/>
+          </p:nvPr>
+        </p:nvPicPr>
+        <p:blipFill>
+          <a:blip r:embed="rId2">
             <a:extLst>
-              <a:ext uri="{FF2B5EF4-FFF2-40B4-BE49-F238E27FC236}">
-                <a16:creationId xmlns:a16="http://schemas.microsoft.com/office/drawing/2014/main" id="{38EC7CDC-7BFF-426E-8FF3-E83F4E21AC74}"/>
+              <a:ext uri="{28A0092B-C50C-407E-A947-70E740481C1C}">
+                <a14:useLocalDpi xmlns:a14="http://schemas.microsoft.com/office/drawing/2010/main" val="0"/>
               </a:ext>
             </a:extLst>
-          </p:cNvPr>
-          <p:cNvSpPr>
-            <a:spLocks noGrp="1"/>
-          </p:cNvSpPr>
-          <p:nvPr>
-            <p:ph idx="1"/>
-          </p:nvPr>
-        </p:nvSpPr>
-        <p:spPr/>
-        <p:txBody>
-          <a:bodyPr/>
-          <a:lstStyle/>
-          <a:p>
-            <a:r>
-              <a:rPr lang="en-US" sz="2400" dirty="0"/>
-              <a:t>Go old school ugly command line interface</a:t>
-            </a:r>
-          </a:p>
-          <a:p>
-            <a:r>
-              <a:rPr lang="en-US" sz="2400" dirty="0"/>
-              <a:t>Needed more time to integrate the front-end and back-end</a:t>
-            </a:r>
-          </a:p>
-          <a:p>
-            <a:r>
-              <a:rPr lang="en-US" sz="2400" dirty="0"/>
-              <a:t>Learned more about Angular and how it is being used today in the industry</a:t>
-            </a:r>
-          </a:p>
-          <a:p>
-            <a:r>
-              <a:rPr lang="en-US" sz="2400" dirty="0"/>
-              <a:t>The hassles of </a:t>
-            </a:r>
-            <a:r>
-              <a:rPr lang="en-US" sz="2400" b="1" dirty="0"/>
-              <a:t>Cross-Origin Resource Sharing (CORS)</a:t>
-            </a:r>
-            <a:br>
-              <a:rPr lang="en-US" dirty="0"/>
-            </a:br>
-            <a:endParaRPr lang="en-US" dirty="0"/>
-          </a:p>
-        </p:txBody>
-      </p:sp>
+          </a:blip>
+          <a:stretch>
+            <a:fillRect/>
+          </a:stretch>
+        </p:blipFill>
+        <p:spPr>
+          <a:xfrm>
+            <a:off x="646111" y="2408909"/>
+            <a:ext cx="4118853" cy="4195762"/>
+          </a:xfrm>
+        </p:spPr>
+      </p:pic>
+      <p:pic>
+        <p:nvPicPr>
+          <p:cNvPr id="5" name="Picture 4"/>
+          <p:cNvPicPr>
+            <a:picLocks noChangeAspect="1"/>
+          </p:cNvPicPr>
+          <p:nvPr/>
+        </p:nvPicPr>
+        <p:blipFill>
+          <a:blip r:embed="rId3">
+            <a:extLst>
+              <a:ext uri="{28A0092B-C50C-407E-A947-70E740481C1C}">
+                <a14:useLocalDpi xmlns:a14="http://schemas.microsoft.com/office/drawing/2010/main" val="0"/>
+              </a:ext>
+            </a:extLst>
+          </a:blip>
+          <a:stretch>
+            <a:fillRect/>
+          </a:stretch>
+        </p:blipFill>
+        <p:spPr>
+          <a:xfrm>
+            <a:off x="6317673" y="3090473"/>
+            <a:ext cx="4821382" cy="3514198"/>
+          </a:xfrm>
+          <a:prstGeom prst="rect">
+            <a:avLst/>
+          </a:prstGeom>
+        </p:spPr>
+      </p:pic>
+      <p:pic>
+        <p:nvPicPr>
+          <p:cNvPr id="6" name="Picture 5"/>
+          <p:cNvPicPr>
+            <a:picLocks noChangeAspect="1"/>
+          </p:cNvPicPr>
+          <p:nvPr/>
+        </p:nvPicPr>
+        <p:blipFill>
+          <a:blip r:embed="rId4">
+            <a:extLst>
+              <a:ext uri="{28A0092B-C50C-407E-A947-70E740481C1C}">
+                <a14:useLocalDpi xmlns:a14="http://schemas.microsoft.com/office/drawing/2010/main" val="0"/>
+              </a:ext>
+            </a:extLst>
+          </a:blip>
+          <a:stretch>
+            <a:fillRect/>
+          </a:stretch>
+        </p:blipFill>
+        <p:spPr>
+          <a:xfrm>
+            <a:off x="5819576" y="452718"/>
+            <a:ext cx="5319479" cy="2438794"/>
+          </a:xfrm>
+          <a:prstGeom prst="rect">
+            <a:avLst/>
+          </a:prstGeom>
+        </p:spPr>
+      </p:pic>
     </p:spTree>
     <p:extLst>
       <p:ext uri="{BB962C8B-B14F-4D97-AF65-F5344CB8AC3E}">
-        <p14:creationId xmlns:p14="http://schemas.microsoft.com/office/powerpoint/2010/main" val="3421963664"/>
+        <p14:creationId xmlns:p14="http://schemas.microsoft.com/office/powerpoint/2010/main" val="3333007403"/>
       </p:ext>
     </p:extLst>
   </p:cSld>
@@ -6654,7 +6694,7 @@
           <p:cNvPr id="2" name="Title 1">
             <a:extLst>
               <a:ext uri="{FF2B5EF4-FFF2-40B4-BE49-F238E27FC236}">
-                <a16:creationId xmlns:a16="http://schemas.microsoft.com/office/drawing/2014/main" id="{CFAB6419-F774-40F3-BF63-FF2A37DFC169}"/>
+                <a16:creationId xmlns:a16="http://schemas.microsoft.com/office/drawing/2014/main" xmlns="" id="{94FD12B6-52C1-4DF8-A738-C8837C389265}"/>
               </a:ext>
             </a:extLst>
           </p:cNvPr>
@@ -6672,7 +6712,7 @@
           <a:p>
             <a:r>
               <a:rPr lang="en-US" dirty="0"/>
-              <a:t>Access to our source code</a:t>
+              <a:t>What we learned?</a:t>
             </a:r>
           </a:p>
         </p:txBody>
@@ -6682,7 +6722,123 @@
           <p:cNvPr id="3" name="Content Placeholder 2">
             <a:extLst>
               <a:ext uri="{FF2B5EF4-FFF2-40B4-BE49-F238E27FC236}">
-                <a16:creationId xmlns:a16="http://schemas.microsoft.com/office/drawing/2014/main" id="{3CC7B365-B402-4DFB-8191-44D8757B6802}"/>
+                <a16:creationId xmlns:a16="http://schemas.microsoft.com/office/drawing/2014/main" xmlns="" id="{38EC7CDC-7BFF-426E-8FF3-E83F4E21AC74}"/>
+              </a:ext>
+            </a:extLst>
+          </p:cNvPr>
+          <p:cNvSpPr>
+            <a:spLocks noGrp="1"/>
+          </p:cNvSpPr>
+          <p:nvPr>
+            <p:ph idx="1"/>
+          </p:nvPr>
+        </p:nvSpPr>
+        <p:spPr/>
+        <p:txBody>
+          <a:bodyPr/>
+          <a:lstStyle/>
+          <a:p>
+            <a:r>
+              <a:rPr lang="en-US" sz="2400" dirty="0"/>
+              <a:t>Go old school ugly command line interface</a:t>
+            </a:r>
+          </a:p>
+          <a:p>
+            <a:r>
+              <a:rPr lang="en-US" sz="2400" dirty="0"/>
+              <a:t>Needed more time to integrate the front-end and back-end</a:t>
+            </a:r>
+          </a:p>
+          <a:p>
+            <a:r>
+              <a:rPr lang="en-US" sz="2400" dirty="0"/>
+              <a:t>Learned more about Angular and how it is being used today in the industry</a:t>
+            </a:r>
+          </a:p>
+          <a:p>
+            <a:r>
+              <a:rPr lang="en-US" sz="2400" dirty="0"/>
+              <a:t>The hassles of </a:t>
+            </a:r>
+            <a:r>
+              <a:rPr lang="en-US" sz="2400" b="1" dirty="0"/>
+              <a:t>Cross-Origin Resource Sharing (CORS)</a:t>
+            </a:r>
+            <a:r>
+              <a:rPr lang="en-US" dirty="0"/>
+              <a:t/>
+            </a:r>
+            <a:br>
+              <a:rPr lang="en-US" dirty="0"/>
+            </a:br>
+            <a:endParaRPr lang="en-US" dirty="0"/>
+          </a:p>
+        </p:txBody>
+      </p:sp>
+    </p:spTree>
+    <p:extLst>
+      <p:ext uri="{BB962C8B-B14F-4D97-AF65-F5344CB8AC3E}">
+        <p14:creationId xmlns:p14="http://schemas.microsoft.com/office/powerpoint/2010/main" val="3421963664"/>
+      </p:ext>
+    </p:extLst>
+  </p:cSld>
+  <p:clrMapOvr>
+    <a:masterClrMapping/>
+  </p:clrMapOvr>
+</p:sld>
+</file>
+
+<file path=ppt/slides/slide7.xml><?xml version="1.0" encoding="utf-8"?>
+<p:sld xmlns:a="http://schemas.openxmlformats.org/drawingml/2006/main" xmlns:r="http://schemas.openxmlformats.org/officeDocument/2006/relationships" xmlns:p="http://schemas.openxmlformats.org/presentationml/2006/main">
+  <p:cSld>
+    <p:spTree>
+      <p:nvGrpSpPr>
+        <p:cNvPr id="1" name=""/>
+        <p:cNvGrpSpPr/>
+        <p:nvPr/>
+      </p:nvGrpSpPr>
+      <p:grpSpPr>
+        <a:xfrm>
+          <a:off x="0" y="0"/>
+          <a:ext cx="0" cy="0"/>
+          <a:chOff x="0" y="0"/>
+          <a:chExt cx="0" cy="0"/>
+        </a:xfrm>
+      </p:grpSpPr>
+      <p:sp>
+        <p:nvSpPr>
+          <p:cNvPr id="2" name="Title 1">
+            <a:extLst>
+              <a:ext uri="{FF2B5EF4-FFF2-40B4-BE49-F238E27FC236}">
+                <a16:creationId xmlns:a16="http://schemas.microsoft.com/office/drawing/2014/main" xmlns="" id="{CFAB6419-F774-40F3-BF63-FF2A37DFC169}"/>
+              </a:ext>
+            </a:extLst>
+          </p:cNvPr>
+          <p:cNvSpPr>
+            <a:spLocks noGrp="1"/>
+          </p:cNvSpPr>
+          <p:nvPr>
+            <p:ph type="title"/>
+          </p:nvPr>
+        </p:nvSpPr>
+        <p:spPr/>
+        <p:txBody>
+          <a:bodyPr/>
+          <a:lstStyle/>
+          <a:p>
+            <a:r>
+              <a:rPr lang="en-US" dirty="0"/>
+              <a:t>Access to our source code</a:t>
+            </a:r>
+          </a:p>
+        </p:txBody>
+      </p:sp>
+      <p:sp>
+        <p:nvSpPr>
+          <p:cNvPr id="3" name="Content Placeholder 2">
+            <a:extLst>
+              <a:ext uri="{FF2B5EF4-FFF2-40B4-BE49-F238E27FC236}">
+                <a16:creationId xmlns:a16="http://schemas.microsoft.com/office/drawing/2014/main" xmlns="" id="{3CC7B365-B402-4DFB-8191-44D8757B6802}"/>
               </a:ext>
             </a:extLst>
           </p:cNvPr>
@@ -6712,7 +6868,7 @@
           <p:cNvPr id="5" name="Picture 4">
             <a:extLst>
               <a:ext uri="{FF2B5EF4-FFF2-40B4-BE49-F238E27FC236}">
-                <a16:creationId xmlns:a16="http://schemas.microsoft.com/office/drawing/2014/main" id="{92B10A32-A6F5-4406-B397-17BA87D33AFF}"/>
+                <a16:creationId xmlns:a16="http://schemas.microsoft.com/office/drawing/2014/main" xmlns="" id="{92B10A32-A6F5-4406-B397-17BA87D33AFF}"/>
               </a:ext>
             </a:extLst>
           </p:cNvPr>
@@ -6750,7 +6906,7 @@
 </p:sld>
 </file>
 
-<file path=ppt/slides/slide7.xml><?xml version="1.0" encoding="utf-8"?>
+<file path=ppt/slides/slide8.xml><?xml version="1.0" encoding="utf-8"?>
 <p:sld xmlns:a="http://schemas.openxmlformats.org/drawingml/2006/main" xmlns:r="http://schemas.openxmlformats.org/officeDocument/2006/relationships" xmlns:p="http://schemas.openxmlformats.org/presentationml/2006/main">
   <p:cSld>
     <p:spTree>
@@ -6772,7 +6928,7 @@
           <p:cNvPr id="2" name="Title 1">
             <a:extLst>
               <a:ext uri="{FF2B5EF4-FFF2-40B4-BE49-F238E27FC236}">
-                <a16:creationId xmlns:a16="http://schemas.microsoft.com/office/drawing/2014/main" id="{8FB9E11A-18F7-4B86-ADAF-89E656DD3C2A}"/>
+                <a16:creationId xmlns:a16="http://schemas.microsoft.com/office/drawing/2014/main" xmlns="" id="{8FB9E11A-18F7-4B86-ADAF-89E656DD3C2A}"/>
               </a:ext>
             </a:extLst>
           </p:cNvPr>
@@ -6800,7 +6956,7 @@
           <p:cNvPr id="4" name="Rectangle 1">
             <a:extLst>
               <a:ext uri="{FF2B5EF4-FFF2-40B4-BE49-F238E27FC236}">
-                <a16:creationId xmlns:a16="http://schemas.microsoft.com/office/drawing/2014/main" id="{D3885063-0031-40B3-B26C-193CC4411274}"/>
+                <a16:creationId xmlns:a16="http://schemas.microsoft.com/office/drawing/2014/main" xmlns="" id="{D3885063-0031-40B3-B26C-193CC4411274}"/>
               </a:ext>
             </a:extLst>
           </p:cNvPr>

</xml_diff>